<commit_message>
a e s t h e t i c
</commit_message>
<xml_diff>
--- a/Voice Classification using deep learning.pptx
+++ b/Voice Classification using deep learning.pptx
@@ -6220,14 +6220,14 @@
           <p:nvPr>
             <p:extLst>
               <p:ext uri="{D42A27DB-BD31-4B8C-83A1-F6EECF244321}">
-                <p14:modId xmlns:p14="http://schemas.microsoft.com/office/powerpoint/2010/main" val="2879066212"/>
+                <p14:modId xmlns:p14="http://schemas.microsoft.com/office/powerpoint/2010/main" val="2296139743"/>
               </p:ext>
             </p:extLst>
           </p:nvPr>
         </p:nvGraphicFramePr>
         <p:xfrm>
-          <a:off x="1998748" y="1446416"/>
-          <a:ext cx="8126154" cy="5429595"/>
+          <a:off x="1610360" y="1446416"/>
+          <a:ext cx="8902930" cy="5100336"/>
         </p:xfrm>
         <a:graphic>
           <a:graphicData uri="http://schemas.openxmlformats.org/drawingml/2006/table">
@@ -6236,14 +6236,14 @@
                 <a:tableStyleId>{073A0DAA-6AF3-43AB-8588-CEC1D06C72B9}</a:tableStyleId>
               </a:tblPr>
               <a:tblGrid>
-                <a:gridCol w="4063077">
+                <a:gridCol w="4451465">
                   <a:extLst>
                     <a:ext uri="{9D8B030D-6E8A-4147-A177-3AD203B41FA5}">
                       <a16:colId xmlns:a16="http://schemas.microsoft.com/office/drawing/2014/main" val="2316133439"/>
                     </a:ext>
                   </a:extLst>
                 </a:gridCol>
-                <a:gridCol w="4063077">
+                <a:gridCol w="4451465">
                   <a:extLst>
                     <a:ext uri="{9D8B030D-6E8A-4147-A177-3AD203B41FA5}">
                       <a16:colId xmlns:a16="http://schemas.microsoft.com/office/drawing/2014/main" val="993843964"/>
@@ -6251,7 +6251,7 @@
                   </a:extLst>
                 </a:gridCol>
               </a:tblGrid>
-              <a:tr h="2152995">
+              <a:tr h="1991376">
                 <a:tc>
                   <a:txBody>
                     <a:bodyPr/>
@@ -7022,15 +7022,7 @@
                             <a:schemeClr val="tx1"/>
                           </a:solidFill>
                         </a:rPr>
-                        <a:t>Foreground and background features vary in their manifestation and the ability to classify them differs. We also aim to study the difference in accuracy of prediction for these </a:t>
-                      </a:r>
-                      <a:r>
-                        <a:rPr lang="en-IN" sz="1100" b="0" baseline="0" smtClean="0">
-                          <a:solidFill>
-                            <a:schemeClr val="tx1"/>
-                          </a:solidFill>
-                        </a:rPr>
-                        <a:t>two cases.</a:t>
+                        <a:t>Foreground and background features vary in their manifestation and the ability to classify them differs. We also aim to study the difference in accuracy of prediction for these two cases.</a:t>
                       </a:r>
                       <a:endParaRPr lang="en-IN" sz="1100" b="0" dirty="0">
                         <a:solidFill>

</xml_diff>

<commit_message>
Added a bunch of slides
</commit_message>
<xml_diff>
--- a/Voice Classification using deep learning.pptx
+++ b/Voice Classification using deep learning.pptx
@@ -5,11 +5,17 @@
     <p:sldMasterId id="2147483660" r:id="rId1"/>
   </p:sldMasterIdLst>
   <p:notesMasterIdLst>
-    <p:notesMasterId r:id="rId4"/>
+    <p:notesMasterId r:id="rId10"/>
   </p:notesMasterIdLst>
   <p:sldIdLst>
     <p:sldId id="256" r:id="rId2"/>
     <p:sldId id="257" r:id="rId3"/>
+    <p:sldId id="261" r:id="rId4"/>
+    <p:sldId id="258" r:id="rId5"/>
+    <p:sldId id="259" r:id="rId6"/>
+    <p:sldId id="260" r:id="rId7"/>
+    <p:sldId id="262" r:id="rId8"/>
+    <p:sldId id="263" r:id="rId9"/>
   </p:sldIdLst>
   <p:sldSz cx="12192000" cy="6858000"/>
   <p:notesSz cx="6858000" cy="9144000"/>
@@ -198,7 +204,7 @@
           <a:p>
             <a:fld id="{D9BE523D-93D5-4CFA-803E-B05D23AD5448}" type="datetimeFigureOut">
               <a:rPr lang="en-IN" smtClean="0"/>
-              <a:t>26-09-2018</a:t>
+              <a:t>27-09-2018</a:t>
             </a:fld>
             <a:endParaRPr lang="en-IN"/>
           </a:p>
@@ -7104,6 +7110,1088 @@
 </p:sld>
 </file>
 
+<file path=ppt/slides/slide3.xml><?xml version="1.0" encoding="utf-8"?>
+<p:sld xmlns:a="http://schemas.openxmlformats.org/drawingml/2006/main" xmlns:r="http://schemas.openxmlformats.org/officeDocument/2006/relationships" xmlns:p="http://schemas.openxmlformats.org/presentationml/2006/main">
+  <p:cSld>
+    <p:spTree>
+      <p:nvGrpSpPr>
+        <p:cNvPr id="1" name=""/>
+        <p:cNvGrpSpPr/>
+        <p:nvPr/>
+      </p:nvGrpSpPr>
+      <p:grpSpPr>
+        <a:xfrm>
+          <a:off x="0" y="0"/>
+          <a:ext cx="0" cy="0"/>
+          <a:chOff x="0" y="0"/>
+          <a:chExt cx="0" cy="0"/>
+        </a:xfrm>
+      </p:grpSpPr>
+      <p:sp>
+        <p:nvSpPr>
+          <p:cNvPr id="2" name="Text Placeholder 1"/>
+          <p:cNvSpPr>
+            <a:spLocks noGrp="1"/>
+          </p:cNvSpPr>
+          <p:nvPr>
+            <p:ph type="body" idx="10"/>
+          </p:nvPr>
+        </p:nvSpPr>
+        <p:spPr/>
+        <p:txBody>
+          <a:bodyPr/>
+          <a:lstStyle/>
+          <a:p>
+            <a:r>
+              <a:rPr lang="en-IN" dirty="0" err="1" smtClean="0"/>
+              <a:t>UrbanSounds</a:t>
+            </a:r>
+            <a:r>
+              <a:rPr lang="en-IN" dirty="0" smtClean="0"/>
+              <a:t> 8K</a:t>
+            </a:r>
+          </a:p>
+          <a:p>
+            <a:pPr marL="800089" lvl="1" indent="-342900">
+              <a:buFont typeface="Arial" panose="020B0604020202020204" pitchFamily="34" charset="0"/>
+              <a:buChar char="•"/>
+            </a:pPr>
+            <a:r>
+              <a:rPr lang="en-US" dirty="0">
+                <a:solidFill>
+                  <a:schemeClr val="tx1"/>
+                </a:solidFill>
+              </a:rPr>
+              <a:t>8732 labeled sound excerpts </a:t>
+            </a:r>
+            <a:endParaRPr lang="en-US" dirty="0" smtClean="0">
+              <a:solidFill>
+                <a:schemeClr val="tx1"/>
+              </a:solidFill>
+            </a:endParaRPr>
+          </a:p>
+          <a:p>
+            <a:pPr marL="800089" lvl="1" indent="-342900">
+              <a:buFont typeface="Arial" panose="020B0604020202020204" pitchFamily="34" charset="0"/>
+              <a:buChar char="•"/>
+            </a:pPr>
+            <a:r>
+              <a:rPr lang="en-US" dirty="0" smtClean="0">
+                <a:solidFill>
+                  <a:schemeClr val="tx1"/>
+                </a:solidFill>
+              </a:rPr>
+              <a:t>4 seconds in length</a:t>
+            </a:r>
+          </a:p>
+          <a:p>
+            <a:pPr marL="800089" lvl="1" indent="-342900">
+              <a:buFont typeface="Arial" panose="020B0604020202020204" pitchFamily="34" charset="0"/>
+              <a:buChar char="•"/>
+            </a:pPr>
+            <a:r>
+              <a:rPr lang="en-US" dirty="0" smtClean="0">
+                <a:solidFill>
+                  <a:schemeClr val="tx1"/>
+                </a:solidFill>
+              </a:rPr>
+              <a:t>WAV files (lossless)</a:t>
+            </a:r>
+          </a:p>
+          <a:p>
+            <a:pPr marL="800089" lvl="1" indent="-342900">
+              <a:buFont typeface="Arial" panose="020B0604020202020204" pitchFamily="34" charset="0"/>
+              <a:buChar char="•"/>
+            </a:pPr>
+            <a:r>
+              <a:rPr lang="en-US" dirty="0" smtClean="0">
+                <a:solidFill>
+                  <a:schemeClr val="tx1"/>
+                </a:solidFill>
+              </a:rPr>
+              <a:t>10 </a:t>
+            </a:r>
+            <a:r>
+              <a:rPr lang="en-US" dirty="0">
+                <a:solidFill>
+                  <a:schemeClr val="tx1"/>
+                </a:solidFill>
+              </a:rPr>
+              <a:t>classes: </a:t>
+            </a:r>
+            <a:r>
+              <a:rPr lang="en-US" i="1" dirty="0" err="1">
+                <a:solidFill>
+                  <a:schemeClr val="tx1"/>
+                </a:solidFill>
+              </a:rPr>
+              <a:t>air_conditioner</a:t>
+            </a:r>
+            <a:r>
+              <a:rPr lang="en-US" i="1" dirty="0">
+                <a:solidFill>
+                  <a:schemeClr val="tx1"/>
+                </a:solidFill>
+              </a:rPr>
+              <a:t>, </a:t>
+            </a:r>
+            <a:r>
+              <a:rPr lang="en-US" i="1" dirty="0" err="1">
+                <a:solidFill>
+                  <a:schemeClr val="tx1"/>
+                </a:solidFill>
+              </a:rPr>
+              <a:t>car_horn</a:t>
+            </a:r>
+            <a:r>
+              <a:rPr lang="en-US" i="1" dirty="0">
+                <a:solidFill>
+                  <a:schemeClr val="tx1"/>
+                </a:solidFill>
+              </a:rPr>
+              <a:t>, </a:t>
+            </a:r>
+            <a:r>
+              <a:rPr lang="en-US" i="1" dirty="0" err="1">
+                <a:solidFill>
+                  <a:schemeClr val="tx1"/>
+                </a:solidFill>
+              </a:rPr>
+              <a:t>children_playing</a:t>
+            </a:r>
+            <a:r>
+              <a:rPr lang="en-US" i="1" dirty="0">
+                <a:solidFill>
+                  <a:schemeClr val="tx1"/>
+                </a:solidFill>
+              </a:rPr>
+              <a:t>, </a:t>
+            </a:r>
+            <a:r>
+              <a:rPr lang="en-US" i="1" dirty="0" err="1">
+                <a:solidFill>
+                  <a:schemeClr val="tx1"/>
+                </a:solidFill>
+              </a:rPr>
+              <a:t>dog_bark</a:t>
+            </a:r>
+            <a:r>
+              <a:rPr lang="en-US" i="1" dirty="0">
+                <a:solidFill>
+                  <a:schemeClr val="tx1"/>
+                </a:solidFill>
+              </a:rPr>
+              <a:t>, drilling, </a:t>
+            </a:r>
+            <a:r>
+              <a:rPr lang="en-US" i="1" dirty="0" err="1">
+                <a:solidFill>
+                  <a:schemeClr val="tx1"/>
+                </a:solidFill>
+              </a:rPr>
+              <a:t>enginge_idling</a:t>
+            </a:r>
+            <a:r>
+              <a:rPr lang="en-US" i="1" dirty="0">
+                <a:solidFill>
+                  <a:schemeClr val="tx1"/>
+                </a:solidFill>
+              </a:rPr>
+              <a:t>, </a:t>
+            </a:r>
+            <a:r>
+              <a:rPr lang="en-US" i="1" dirty="0" err="1">
+                <a:solidFill>
+                  <a:schemeClr val="tx1"/>
+                </a:solidFill>
+              </a:rPr>
+              <a:t>gun_shot</a:t>
+            </a:r>
+            <a:r>
+              <a:rPr lang="en-US" i="1" dirty="0">
+                <a:solidFill>
+                  <a:schemeClr val="tx1"/>
+                </a:solidFill>
+              </a:rPr>
+              <a:t>, jackhammer, siren, and </a:t>
+            </a:r>
+            <a:r>
+              <a:rPr lang="en-US" i="1" dirty="0" err="1">
+                <a:solidFill>
+                  <a:schemeClr val="tx1"/>
+                </a:solidFill>
+              </a:rPr>
+              <a:t>street_music</a:t>
+            </a:r>
+            <a:endParaRPr lang="en-IN" i="1" dirty="0"/>
+          </a:p>
+          <a:p>
+            <a:pPr marL="800089" lvl="1" indent="-342900">
+              <a:buFont typeface="Arial" panose="020B0604020202020204" pitchFamily="34" charset="0"/>
+              <a:buChar char="•"/>
+            </a:pPr>
+            <a:endParaRPr lang="en-IN" dirty="0" smtClean="0"/>
+          </a:p>
+        </p:txBody>
+      </p:sp>
+      <p:sp>
+        <p:nvSpPr>
+          <p:cNvPr id="3" name="Title 2"/>
+          <p:cNvSpPr>
+            <a:spLocks noGrp="1"/>
+          </p:cNvSpPr>
+          <p:nvPr>
+            <p:ph type="title"/>
+          </p:nvPr>
+        </p:nvSpPr>
+        <p:spPr/>
+        <p:txBody>
+          <a:bodyPr/>
+          <a:lstStyle/>
+          <a:p>
+            <a:r>
+              <a:rPr lang="en-IN" dirty="0" smtClean="0"/>
+              <a:t>Dataset</a:t>
+            </a:r>
+            <a:endParaRPr lang="en-IN" dirty="0"/>
+          </a:p>
+        </p:txBody>
+      </p:sp>
+    </p:spTree>
+    <p:extLst>
+      <p:ext uri="{BB962C8B-B14F-4D97-AF65-F5344CB8AC3E}">
+        <p14:creationId xmlns:p14="http://schemas.microsoft.com/office/powerpoint/2010/main" val="4266415871"/>
+      </p:ext>
+    </p:extLst>
+  </p:cSld>
+  <p:clrMapOvr>
+    <a:masterClrMapping/>
+  </p:clrMapOvr>
+</p:sld>
+</file>
+
+<file path=ppt/slides/slide4.xml><?xml version="1.0" encoding="utf-8"?>
+<p:sld xmlns:a="http://schemas.openxmlformats.org/drawingml/2006/main" xmlns:r="http://schemas.openxmlformats.org/officeDocument/2006/relationships" xmlns:p="http://schemas.openxmlformats.org/presentationml/2006/main">
+  <p:cSld>
+    <p:spTree>
+      <p:nvGrpSpPr>
+        <p:cNvPr id="1" name=""/>
+        <p:cNvGrpSpPr/>
+        <p:nvPr/>
+      </p:nvGrpSpPr>
+      <p:grpSpPr>
+        <a:xfrm>
+          <a:off x="0" y="0"/>
+          <a:ext cx="0" cy="0"/>
+          <a:chOff x="0" y="0"/>
+          <a:chExt cx="0" cy="0"/>
+        </a:xfrm>
+      </p:grpSpPr>
+      <p:sp>
+        <p:nvSpPr>
+          <p:cNvPr id="2" name="Title 1"/>
+          <p:cNvSpPr>
+            <a:spLocks noGrp="1"/>
+          </p:cNvSpPr>
+          <p:nvPr>
+            <p:ph type="title"/>
+          </p:nvPr>
+        </p:nvSpPr>
+        <p:spPr/>
+        <p:txBody>
+          <a:bodyPr/>
+          <a:lstStyle/>
+          <a:p>
+            <a:r>
+              <a:rPr lang="en-IN" dirty="0" err="1" smtClean="0"/>
+              <a:t>Preprocessing</a:t>
+            </a:r>
+            <a:endParaRPr lang="en-IN" dirty="0"/>
+          </a:p>
+        </p:txBody>
+      </p:sp>
+      <p:sp>
+        <p:nvSpPr>
+          <p:cNvPr id="3" name="Text Placeholder 2"/>
+          <p:cNvSpPr>
+            <a:spLocks noGrp="1"/>
+          </p:cNvSpPr>
+          <p:nvPr>
+            <p:ph type="body" idx="10"/>
+          </p:nvPr>
+        </p:nvSpPr>
+        <p:spPr/>
+        <p:txBody>
+          <a:bodyPr/>
+          <a:lstStyle/>
+          <a:p>
+            <a:r>
+              <a:rPr lang="en-IN" dirty="0" err="1" smtClean="0"/>
+              <a:t>Librosa</a:t>
+            </a:r>
+            <a:r>
+              <a:rPr lang="en-IN" dirty="0" smtClean="0"/>
+              <a:t> – Audio processing library for python</a:t>
+            </a:r>
+          </a:p>
+          <a:p>
+            <a:pPr marL="800089" lvl="1" indent="-342900">
+              <a:buFont typeface="Arial" panose="020B0604020202020204" pitchFamily="34" charset="0"/>
+              <a:buChar char="•"/>
+            </a:pPr>
+            <a:r>
+              <a:rPr lang="en-IN" dirty="0" smtClean="0"/>
+              <a:t>Loading wav files: returns sampling rate and time series</a:t>
+            </a:r>
+          </a:p>
+          <a:p>
+            <a:pPr marL="800089" lvl="1" indent="-342900">
+              <a:buFont typeface="Arial" panose="020B0604020202020204" pitchFamily="34" charset="0"/>
+              <a:buChar char="•"/>
+            </a:pPr>
+            <a:r>
+              <a:rPr lang="en-IN" dirty="0" smtClean="0"/>
+              <a:t>Power spectrogram and </a:t>
+            </a:r>
+            <a:r>
+              <a:rPr lang="en-IN" dirty="0" err="1" smtClean="0"/>
+              <a:t>wavefrom</a:t>
+            </a:r>
+            <a:r>
+              <a:rPr lang="en-IN" dirty="0" smtClean="0"/>
+              <a:t> as </a:t>
+            </a:r>
+            <a:r>
+              <a:rPr lang="en-IN" dirty="0" err="1" smtClean="0"/>
+              <a:t>arraylike</a:t>
+            </a:r>
+            <a:r>
+              <a:rPr lang="en-IN" dirty="0" smtClean="0"/>
+              <a:t> objects</a:t>
+            </a:r>
+          </a:p>
+          <a:p>
+            <a:r>
+              <a:rPr lang="en-IN" dirty="0" err="1" smtClean="0"/>
+              <a:t>Matplotlib</a:t>
+            </a:r>
+            <a:r>
+              <a:rPr lang="en-IN" dirty="0"/>
+              <a:t> </a:t>
+            </a:r>
+            <a:r>
+              <a:rPr lang="en-IN" dirty="0" smtClean="0"/>
+              <a:t>– graphing library for python</a:t>
+            </a:r>
+          </a:p>
+          <a:p>
+            <a:pPr marL="800089" lvl="1" indent="-342900">
+              <a:buFont typeface="Arial" panose="020B0604020202020204" pitchFamily="34" charset="0"/>
+              <a:buChar char="•"/>
+            </a:pPr>
+            <a:r>
+              <a:rPr lang="en-IN" dirty="0" err="1" smtClean="0"/>
+              <a:t>Specgram</a:t>
+            </a:r>
+            <a:r>
+              <a:rPr lang="en-IN" dirty="0" smtClean="0"/>
+              <a:t> method plots spectrograms</a:t>
+            </a:r>
+          </a:p>
+        </p:txBody>
+      </p:sp>
+      <p:pic>
+        <p:nvPicPr>
+          <p:cNvPr id="6" name="Picture 5"/>
+          <p:cNvPicPr>
+            <a:picLocks noChangeAspect="1"/>
+          </p:cNvPicPr>
+          <p:nvPr/>
+        </p:nvPicPr>
+        <p:blipFill>
+          <a:blip r:embed="rId2">
+            <a:extLst>
+              <a:ext uri="{28A0092B-C50C-407E-A947-70E740481C1C}">
+                <a14:useLocalDpi xmlns:a14="http://schemas.microsoft.com/office/drawing/2010/main" val="0"/>
+              </a:ext>
+            </a:extLst>
+          </a:blip>
+          <a:stretch>
+            <a:fillRect/>
+          </a:stretch>
+        </p:blipFill>
+        <p:spPr>
+          <a:xfrm>
+            <a:off x="413291" y="4157134"/>
+            <a:ext cx="5397637" cy="1584241"/>
+          </a:xfrm>
+          <a:prstGeom prst="rect">
+            <a:avLst/>
+          </a:prstGeom>
+        </p:spPr>
+      </p:pic>
+      <p:pic>
+        <p:nvPicPr>
+          <p:cNvPr id="7" name="Picture 6"/>
+          <p:cNvPicPr>
+            <a:picLocks noChangeAspect="1"/>
+          </p:cNvPicPr>
+          <p:nvPr/>
+        </p:nvPicPr>
+        <p:blipFill>
+          <a:blip r:embed="rId3">
+            <a:extLst>
+              <a:ext uri="{28A0092B-C50C-407E-A947-70E740481C1C}">
+                <a14:useLocalDpi xmlns:a14="http://schemas.microsoft.com/office/drawing/2010/main" val="0"/>
+              </a:ext>
+            </a:extLst>
+          </a:blip>
+          <a:stretch>
+            <a:fillRect/>
+          </a:stretch>
+        </p:blipFill>
+        <p:spPr>
+          <a:xfrm>
+            <a:off x="6028808" y="4157134"/>
+            <a:ext cx="5837877" cy="1600048"/>
+          </a:xfrm>
+          <a:prstGeom prst="rect">
+            <a:avLst/>
+          </a:prstGeom>
+        </p:spPr>
+      </p:pic>
+    </p:spTree>
+    <p:extLst>
+      <p:ext uri="{BB962C8B-B14F-4D97-AF65-F5344CB8AC3E}">
+        <p14:creationId xmlns:p14="http://schemas.microsoft.com/office/powerpoint/2010/main" val="2537489081"/>
+      </p:ext>
+    </p:extLst>
+  </p:cSld>
+  <p:clrMapOvr>
+    <a:masterClrMapping/>
+  </p:clrMapOvr>
+</p:sld>
+</file>
+
+<file path=ppt/slides/slide5.xml><?xml version="1.0" encoding="utf-8"?>
+<p:sld xmlns:a="http://schemas.openxmlformats.org/drawingml/2006/main" xmlns:r="http://schemas.openxmlformats.org/officeDocument/2006/relationships" xmlns:p="http://schemas.openxmlformats.org/presentationml/2006/main">
+  <p:cSld>
+    <p:spTree>
+      <p:nvGrpSpPr>
+        <p:cNvPr id="1" name=""/>
+        <p:cNvGrpSpPr/>
+        <p:nvPr/>
+      </p:nvGrpSpPr>
+      <p:grpSpPr>
+        <a:xfrm>
+          <a:off x="0" y="0"/>
+          <a:ext cx="0" cy="0"/>
+          <a:chOff x="0" y="0"/>
+          <a:chExt cx="0" cy="0"/>
+        </a:xfrm>
+      </p:grpSpPr>
+      <p:sp>
+        <p:nvSpPr>
+          <p:cNvPr id="2" name="Text Placeholder 1"/>
+          <p:cNvSpPr>
+            <a:spLocks noGrp="1"/>
+          </p:cNvSpPr>
+          <p:nvPr>
+            <p:ph type="body" idx="10"/>
+          </p:nvPr>
+        </p:nvSpPr>
+        <p:spPr/>
+        <p:txBody>
+          <a:bodyPr/>
+          <a:lstStyle/>
+          <a:p>
+            <a:r>
+              <a:rPr lang="en-IN" dirty="0" smtClean="0"/>
+              <a:t>Multilayer Perceptron</a:t>
+            </a:r>
+          </a:p>
+          <a:p>
+            <a:r>
+              <a:rPr lang="en-IN" dirty="0" smtClean="0"/>
+              <a:t>Parameters:</a:t>
+            </a:r>
+          </a:p>
+          <a:p>
+            <a:pPr marL="800089" lvl="1" indent="-342900">
+              <a:buFont typeface="Arial" panose="020B0604020202020204" pitchFamily="34" charset="0"/>
+              <a:buChar char="•"/>
+            </a:pPr>
+            <a:r>
+              <a:rPr lang="en-IN" dirty="0" smtClean="0"/>
+              <a:t>Number of epochs</a:t>
+            </a:r>
+          </a:p>
+          <a:p>
+            <a:pPr marL="800089" lvl="1" indent="-342900">
+              <a:buFont typeface="Arial" panose="020B0604020202020204" pitchFamily="34" charset="0"/>
+              <a:buChar char="•"/>
+            </a:pPr>
+            <a:r>
+              <a:rPr lang="en-IN" dirty="0" smtClean="0"/>
+              <a:t>Learning rate</a:t>
+            </a:r>
+          </a:p>
+          <a:p>
+            <a:pPr marL="800089" lvl="1" indent="-342900">
+              <a:buFont typeface="Arial" panose="020B0604020202020204" pitchFamily="34" charset="0"/>
+              <a:buChar char="•"/>
+            </a:pPr>
+            <a:r>
+              <a:rPr lang="en-IN" dirty="0" smtClean="0"/>
+              <a:t>Activation function</a:t>
+            </a:r>
+          </a:p>
+          <a:p>
+            <a:pPr marL="800089" lvl="1" indent="-342900">
+              <a:buFont typeface="Arial" panose="020B0604020202020204" pitchFamily="34" charset="0"/>
+              <a:buChar char="•"/>
+            </a:pPr>
+            <a:r>
+              <a:rPr lang="en-IN" dirty="0" smtClean="0"/>
+              <a:t>Loss function</a:t>
+            </a:r>
+          </a:p>
+          <a:p>
+            <a:pPr marL="800089" lvl="1" indent="-342900">
+              <a:buFont typeface="Arial" panose="020B0604020202020204" pitchFamily="34" charset="0"/>
+              <a:buChar char="•"/>
+            </a:pPr>
+            <a:r>
+              <a:rPr lang="en-IN" dirty="0" smtClean="0"/>
+              <a:t>Number of hidden layers</a:t>
+            </a:r>
+          </a:p>
+        </p:txBody>
+      </p:sp>
+      <p:sp>
+        <p:nvSpPr>
+          <p:cNvPr id="3" name="Title 2"/>
+          <p:cNvSpPr>
+            <a:spLocks noGrp="1"/>
+          </p:cNvSpPr>
+          <p:nvPr>
+            <p:ph type="title"/>
+          </p:nvPr>
+        </p:nvSpPr>
+        <p:spPr/>
+        <p:txBody>
+          <a:bodyPr/>
+          <a:lstStyle/>
+          <a:p>
+            <a:r>
+              <a:rPr lang="en-IN" dirty="0" smtClean="0"/>
+              <a:t>Architecture</a:t>
+            </a:r>
+            <a:endParaRPr lang="en-IN" dirty="0"/>
+          </a:p>
+        </p:txBody>
+      </p:sp>
+      <p:pic>
+        <p:nvPicPr>
+          <p:cNvPr id="4" name="Picture 3"/>
+          <p:cNvPicPr>
+            <a:picLocks noChangeAspect="1"/>
+          </p:cNvPicPr>
+          <p:nvPr/>
+        </p:nvPicPr>
+        <p:blipFill>
+          <a:blip r:embed="rId2" cstate="print">
+            <a:extLst>
+              <a:ext uri="{28A0092B-C50C-407E-A947-70E740481C1C}">
+                <a14:useLocalDpi xmlns:a14="http://schemas.microsoft.com/office/drawing/2010/main" val="0"/>
+              </a:ext>
+            </a:extLst>
+          </a:blip>
+          <a:stretch>
+            <a:fillRect/>
+          </a:stretch>
+        </p:blipFill>
+        <p:spPr>
+          <a:xfrm>
+            <a:off x="4957773" y="2563439"/>
+            <a:ext cx="3866396" cy="2976378"/>
+          </a:xfrm>
+          <a:prstGeom prst="rect">
+            <a:avLst/>
+          </a:prstGeom>
+        </p:spPr>
+      </p:pic>
+    </p:spTree>
+    <p:extLst>
+      <p:ext uri="{BB962C8B-B14F-4D97-AF65-F5344CB8AC3E}">
+        <p14:creationId xmlns:p14="http://schemas.microsoft.com/office/powerpoint/2010/main" val="2380746359"/>
+      </p:ext>
+    </p:extLst>
+  </p:cSld>
+  <p:clrMapOvr>
+    <a:masterClrMapping/>
+  </p:clrMapOvr>
+</p:sld>
+</file>
+
+<file path=ppt/slides/slide6.xml><?xml version="1.0" encoding="utf-8"?>
+<p:sld xmlns:a="http://schemas.openxmlformats.org/drawingml/2006/main" xmlns:r="http://schemas.openxmlformats.org/officeDocument/2006/relationships" xmlns:p="http://schemas.openxmlformats.org/presentationml/2006/main">
+  <p:cSld>
+    <p:spTree>
+      <p:nvGrpSpPr>
+        <p:cNvPr id="1" name=""/>
+        <p:cNvGrpSpPr/>
+        <p:nvPr/>
+      </p:nvGrpSpPr>
+      <p:grpSpPr>
+        <a:xfrm>
+          <a:off x="0" y="0"/>
+          <a:ext cx="0" cy="0"/>
+          <a:chOff x="0" y="0"/>
+          <a:chExt cx="0" cy="0"/>
+        </a:xfrm>
+      </p:grpSpPr>
+      <p:sp>
+        <p:nvSpPr>
+          <p:cNvPr id="2" name="Text Placeholder 1"/>
+          <p:cNvSpPr>
+            <a:spLocks noGrp="1"/>
+          </p:cNvSpPr>
+          <p:nvPr>
+            <p:ph type="body" idx="10"/>
+          </p:nvPr>
+        </p:nvSpPr>
+        <p:spPr/>
+        <p:txBody>
+          <a:bodyPr/>
+          <a:lstStyle/>
+          <a:p>
+            <a:r>
+              <a:rPr lang="en-IN" dirty="0" smtClean="0"/>
+              <a:t>Recurrent Neural Network</a:t>
+            </a:r>
+          </a:p>
+          <a:p>
+            <a:pPr marL="800089" lvl="1" indent="-342900">
+              <a:buFont typeface="Arial" panose="020B0604020202020204" pitchFamily="34" charset="0"/>
+              <a:buChar char="•"/>
+            </a:pPr>
+            <a:r>
+              <a:rPr lang="en-IN" dirty="0" smtClean="0"/>
+              <a:t>Parameters (Similar to MLP)</a:t>
+            </a:r>
+          </a:p>
+          <a:p>
+            <a:pPr marL="800089" lvl="1" indent="-342900">
+              <a:buFont typeface="Arial" panose="020B0604020202020204" pitchFamily="34" charset="0"/>
+              <a:buChar char="•"/>
+            </a:pPr>
+            <a:r>
+              <a:rPr lang="en-IN" dirty="0" smtClean="0"/>
+              <a:t>Output from nodes are fed </a:t>
+            </a:r>
+            <a:br>
+              <a:rPr lang="en-IN" dirty="0" smtClean="0"/>
+            </a:br>
+            <a:r>
+              <a:rPr lang="en-IN" dirty="0" smtClean="0"/>
+              <a:t>back to same node as input </a:t>
+            </a:r>
+            <a:br>
+              <a:rPr lang="en-IN" dirty="0" smtClean="0"/>
+            </a:br>
+            <a:r>
+              <a:rPr lang="en-IN" dirty="0" smtClean="0"/>
+              <a:t>to account for previously learnt </a:t>
+            </a:r>
+            <a:br>
+              <a:rPr lang="en-IN" dirty="0" smtClean="0"/>
+            </a:br>
+            <a:r>
+              <a:rPr lang="en-IN" dirty="0" smtClean="0"/>
+              <a:t>information.</a:t>
+            </a:r>
+          </a:p>
+          <a:p>
+            <a:pPr marL="800089" lvl="1" indent="-342900">
+              <a:buFont typeface="Arial" panose="020B0604020202020204" pitchFamily="34" charset="0"/>
+              <a:buChar char="•"/>
+            </a:pPr>
+            <a:r>
+              <a:rPr lang="en-IN" dirty="0" smtClean="0"/>
+              <a:t>Thus useful while dealing with</a:t>
+            </a:r>
+            <a:br>
+              <a:rPr lang="en-IN" dirty="0" smtClean="0"/>
+            </a:br>
+            <a:r>
+              <a:rPr lang="en-IN" dirty="0" smtClean="0"/>
+              <a:t>applications that benefit from </a:t>
+            </a:r>
+            <a:br>
+              <a:rPr lang="en-IN" dirty="0" smtClean="0"/>
+            </a:br>
+            <a:r>
+              <a:rPr lang="en-IN" dirty="0" smtClean="0"/>
+              <a:t>temporal dependence.</a:t>
+            </a:r>
+          </a:p>
+        </p:txBody>
+      </p:sp>
+      <p:sp>
+        <p:nvSpPr>
+          <p:cNvPr id="3" name="Title 2"/>
+          <p:cNvSpPr>
+            <a:spLocks noGrp="1"/>
+          </p:cNvSpPr>
+          <p:nvPr>
+            <p:ph type="title"/>
+          </p:nvPr>
+        </p:nvSpPr>
+        <p:spPr/>
+        <p:txBody>
+          <a:bodyPr/>
+          <a:lstStyle/>
+          <a:p>
+            <a:r>
+              <a:rPr lang="en-IN" dirty="0" smtClean="0"/>
+              <a:t>Architecture (contd.)</a:t>
+            </a:r>
+            <a:endParaRPr lang="en-IN" dirty="0"/>
+          </a:p>
+        </p:txBody>
+      </p:sp>
+      <p:pic>
+        <p:nvPicPr>
+          <p:cNvPr id="4" name="Picture 3"/>
+          <p:cNvPicPr>
+            <a:picLocks noChangeAspect="1"/>
+          </p:cNvPicPr>
+          <p:nvPr/>
+        </p:nvPicPr>
+        <p:blipFill>
+          <a:blip r:embed="rId2" cstate="print">
+            <a:extLst>
+              <a:ext uri="{28A0092B-C50C-407E-A947-70E740481C1C}">
+                <a14:useLocalDpi xmlns:a14="http://schemas.microsoft.com/office/drawing/2010/main" val="0"/>
+              </a:ext>
+            </a:extLst>
+          </a:blip>
+          <a:stretch>
+            <a:fillRect/>
+          </a:stretch>
+        </p:blipFill>
+        <p:spPr>
+          <a:xfrm>
+            <a:off x="5223615" y="2537276"/>
+            <a:ext cx="5481814" cy="3028703"/>
+          </a:xfrm>
+          <a:prstGeom prst="rect">
+            <a:avLst/>
+          </a:prstGeom>
+        </p:spPr>
+      </p:pic>
+    </p:spTree>
+    <p:extLst>
+      <p:ext uri="{BB962C8B-B14F-4D97-AF65-F5344CB8AC3E}">
+        <p14:creationId xmlns:p14="http://schemas.microsoft.com/office/powerpoint/2010/main" val="2615920851"/>
+      </p:ext>
+    </p:extLst>
+  </p:cSld>
+  <p:clrMapOvr>
+    <a:masterClrMapping/>
+  </p:clrMapOvr>
+</p:sld>
+</file>
+
+<file path=ppt/slides/slide7.xml><?xml version="1.0" encoding="utf-8"?>
+<p:sld xmlns:a="http://schemas.openxmlformats.org/drawingml/2006/main" xmlns:r="http://schemas.openxmlformats.org/officeDocument/2006/relationships" xmlns:p="http://schemas.openxmlformats.org/presentationml/2006/main">
+  <p:cSld>
+    <p:spTree>
+      <p:nvGrpSpPr>
+        <p:cNvPr id="1" name=""/>
+        <p:cNvGrpSpPr/>
+        <p:nvPr/>
+      </p:nvGrpSpPr>
+      <p:grpSpPr>
+        <a:xfrm>
+          <a:off x="0" y="0"/>
+          <a:ext cx="0" cy="0"/>
+          <a:chOff x="0" y="0"/>
+          <a:chExt cx="0" cy="0"/>
+        </a:xfrm>
+      </p:grpSpPr>
+      <p:sp>
+        <p:nvSpPr>
+          <p:cNvPr id="2" name="Text Placeholder 1"/>
+          <p:cNvSpPr>
+            <a:spLocks noGrp="1"/>
+          </p:cNvSpPr>
+          <p:nvPr>
+            <p:ph type="body" idx="10"/>
+          </p:nvPr>
+        </p:nvSpPr>
+        <p:spPr/>
+        <p:txBody>
+          <a:bodyPr/>
+          <a:lstStyle/>
+          <a:p>
+            <a:r>
+              <a:rPr lang="en-IN" dirty="0" smtClean="0"/>
+              <a:t>Convolutional Neural Network</a:t>
+            </a:r>
+          </a:p>
+          <a:p>
+            <a:pPr marL="800089" lvl="1" indent="-342900">
+              <a:buFont typeface="Arial" panose="020B0604020202020204" pitchFamily="34" charset="0"/>
+              <a:buChar char="•"/>
+            </a:pPr>
+            <a:r>
+              <a:rPr lang="en-IN" dirty="0" smtClean="0"/>
+              <a:t>Convolutional window that convolves over the image to generate an output that ultimately results in feature extraction.</a:t>
+            </a:r>
+          </a:p>
+          <a:p>
+            <a:pPr marL="800089" lvl="1" indent="-342900">
+              <a:buFont typeface="Arial" panose="020B0604020202020204" pitchFamily="34" charset="0"/>
+              <a:buChar char="•"/>
+            </a:pPr>
+            <a:r>
+              <a:rPr lang="en-IN" dirty="0" smtClean="0"/>
+              <a:t>Parameters:</a:t>
+            </a:r>
+          </a:p>
+          <a:p>
+            <a:pPr marL="1257277" lvl="2" indent="-342900">
+              <a:buFont typeface="Arial" panose="020B0604020202020204" pitchFamily="34" charset="0"/>
+              <a:buChar char="•"/>
+            </a:pPr>
+            <a:r>
+              <a:rPr lang="en-IN" dirty="0" smtClean="0"/>
+              <a:t>Stride, Window size, Padding</a:t>
+            </a:r>
+          </a:p>
+          <a:p>
+            <a:pPr marL="1257277" lvl="2" indent="-342900">
+              <a:buFont typeface="Arial" panose="020B0604020202020204" pitchFamily="34" charset="0"/>
+              <a:buChar char="•"/>
+            </a:pPr>
+            <a:r>
+              <a:rPr lang="en-IN" dirty="0" smtClean="0"/>
+              <a:t>Learning Rate</a:t>
+            </a:r>
+          </a:p>
+          <a:p>
+            <a:pPr marL="1257277" lvl="2" indent="-342900">
+              <a:buFont typeface="Arial" panose="020B0604020202020204" pitchFamily="34" charset="0"/>
+              <a:buChar char="•"/>
+            </a:pPr>
+            <a:r>
+              <a:rPr lang="en-IN" dirty="0" smtClean="0"/>
+              <a:t>Epochs</a:t>
+            </a:r>
+          </a:p>
+          <a:p>
+            <a:pPr marL="1257277" lvl="2" indent="-342900">
+              <a:buFont typeface="Arial" panose="020B0604020202020204" pitchFamily="34" charset="0"/>
+              <a:buChar char="•"/>
+            </a:pPr>
+            <a:r>
+              <a:rPr lang="en-IN" dirty="0" smtClean="0"/>
+              <a:t>Optimizer</a:t>
+            </a:r>
+          </a:p>
+          <a:p>
+            <a:pPr marL="1257277" lvl="2" indent="-342900">
+              <a:buFont typeface="Arial" panose="020B0604020202020204" pitchFamily="34" charset="0"/>
+              <a:buChar char="•"/>
+            </a:pPr>
+            <a:r>
+              <a:rPr lang="en-IN" dirty="0" smtClean="0"/>
+              <a:t>Number of layers</a:t>
+            </a:r>
+          </a:p>
+          <a:p>
+            <a:pPr marL="1257277" lvl="2" indent="-342900">
+              <a:buFont typeface="Arial" panose="020B0604020202020204" pitchFamily="34" charset="0"/>
+              <a:buChar char="•"/>
+            </a:pPr>
+            <a:r>
+              <a:rPr lang="en-IN" dirty="0" smtClean="0"/>
+              <a:t>Activation function</a:t>
+            </a:r>
+          </a:p>
+          <a:p>
+            <a:pPr marL="1257277" lvl="2" indent="-342900">
+              <a:buFont typeface="Arial" panose="020B0604020202020204" pitchFamily="34" charset="0"/>
+              <a:buChar char="•"/>
+            </a:pPr>
+            <a:r>
+              <a:rPr lang="en-IN" dirty="0" smtClean="0"/>
+              <a:t>Pooling layers</a:t>
+            </a:r>
+          </a:p>
+        </p:txBody>
+      </p:sp>
+      <p:sp>
+        <p:nvSpPr>
+          <p:cNvPr id="3" name="Title 2"/>
+          <p:cNvSpPr>
+            <a:spLocks noGrp="1"/>
+          </p:cNvSpPr>
+          <p:nvPr>
+            <p:ph type="title"/>
+          </p:nvPr>
+        </p:nvSpPr>
+        <p:spPr/>
+        <p:txBody>
+          <a:bodyPr/>
+          <a:lstStyle/>
+          <a:p>
+            <a:r>
+              <a:rPr lang="en-IN" dirty="0" smtClean="0"/>
+              <a:t>Architecture (contd.)</a:t>
+            </a:r>
+            <a:endParaRPr lang="en-IN" dirty="0"/>
+          </a:p>
+        </p:txBody>
+      </p:sp>
+      <p:pic>
+        <p:nvPicPr>
+          <p:cNvPr id="4" name="Picture 3"/>
+          <p:cNvPicPr>
+            <a:picLocks noChangeAspect="1"/>
+          </p:cNvPicPr>
+          <p:nvPr/>
+        </p:nvPicPr>
+        <p:blipFill>
+          <a:blip r:embed="rId2" cstate="print">
+            <a:extLst>
+              <a:ext uri="{28A0092B-C50C-407E-A947-70E740481C1C}">
+                <a14:useLocalDpi xmlns:a14="http://schemas.microsoft.com/office/drawing/2010/main" val="0"/>
+              </a:ext>
+            </a:extLst>
+          </a:blip>
+          <a:stretch>
+            <a:fillRect/>
+          </a:stretch>
+        </p:blipFill>
+        <p:spPr>
+          <a:xfrm>
+            <a:off x="5370570" y="3406899"/>
+            <a:ext cx="6194506" cy="2510941"/>
+          </a:xfrm>
+          <a:prstGeom prst="rect">
+            <a:avLst/>
+          </a:prstGeom>
+        </p:spPr>
+      </p:pic>
+    </p:spTree>
+    <p:extLst>
+      <p:ext uri="{BB962C8B-B14F-4D97-AF65-F5344CB8AC3E}">
+        <p14:creationId xmlns:p14="http://schemas.microsoft.com/office/powerpoint/2010/main" val="3138635"/>
+      </p:ext>
+    </p:extLst>
+  </p:cSld>
+  <p:clrMapOvr>
+    <a:masterClrMapping/>
+  </p:clrMapOvr>
+</p:sld>
+</file>
+
+<file path=ppt/slides/slide8.xml><?xml version="1.0" encoding="utf-8"?>
+<p:sld xmlns:a="http://schemas.openxmlformats.org/drawingml/2006/main" xmlns:r="http://schemas.openxmlformats.org/officeDocument/2006/relationships" xmlns:p="http://schemas.openxmlformats.org/presentationml/2006/main">
+  <p:cSld>
+    <p:spTree>
+      <p:nvGrpSpPr>
+        <p:cNvPr id="1" name=""/>
+        <p:cNvGrpSpPr/>
+        <p:nvPr/>
+      </p:nvGrpSpPr>
+      <p:grpSpPr>
+        <a:xfrm>
+          <a:off x="0" y="0"/>
+          <a:ext cx="0" cy="0"/>
+          <a:chOff x="0" y="0"/>
+          <a:chExt cx="0" cy="0"/>
+        </a:xfrm>
+      </p:grpSpPr>
+      <p:sp>
+        <p:nvSpPr>
+          <p:cNvPr id="2" name="Text Placeholder 1"/>
+          <p:cNvSpPr>
+            <a:spLocks noGrp="1"/>
+          </p:cNvSpPr>
+          <p:nvPr>
+            <p:ph type="body" idx="10"/>
+          </p:nvPr>
+        </p:nvSpPr>
+        <p:spPr/>
+        <p:txBody>
+          <a:bodyPr/>
+          <a:lstStyle/>
+          <a:p>
+            <a:r>
+              <a:rPr lang="en-IN" dirty="0" smtClean="0"/>
+              <a:t>Attempting to compare the results across various learning techniques</a:t>
+            </a:r>
+          </a:p>
+          <a:p>
+            <a:r>
+              <a:rPr lang="en-IN" dirty="0" smtClean="0"/>
+              <a:t>We expect to achieve maximum accuracy using CNNs given the fact that input is in the form of an image that is best dealt with using CNNs.</a:t>
+            </a:r>
+          </a:p>
+          <a:p>
+            <a:r>
+              <a:rPr lang="en-IN" dirty="0" smtClean="0"/>
+              <a:t>We aim to develop a robust system using deep learning techniques and learn to tune the parameters and the architecture itself.</a:t>
+            </a:r>
+          </a:p>
+          <a:p>
+            <a:r>
+              <a:rPr lang="en-IN" dirty="0" smtClean="0"/>
+              <a:t>We also aim to study the confusion matrix to observe which classes are frequently misclassified and try to reason it.</a:t>
+            </a:r>
+          </a:p>
+        </p:txBody>
+      </p:sp>
+      <p:sp>
+        <p:nvSpPr>
+          <p:cNvPr id="3" name="Title 2"/>
+          <p:cNvSpPr>
+            <a:spLocks noGrp="1"/>
+          </p:cNvSpPr>
+          <p:nvPr>
+            <p:ph type="title"/>
+          </p:nvPr>
+        </p:nvSpPr>
+        <p:spPr/>
+        <p:txBody>
+          <a:bodyPr/>
+          <a:lstStyle/>
+          <a:p>
+            <a:r>
+              <a:rPr lang="en-IN" dirty="0" smtClean="0"/>
+              <a:t>Inference</a:t>
+            </a:r>
+            <a:endParaRPr lang="en-IN" dirty="0"/>
+          </a:p>
+        </p:txBody>
+      </p:sp>
+    </p:spTree>
+    <p:extLst>
+      <p:ext uri="{BB962C8B-B14F-4D97-AF65-F5344CB8AC3E}">
+        <p14:creationId xmlns:p14="http://schemas.microsoft.com/office/powerpoint/2010/main" val="193470411"/>
+      </p:ext>
+    </p:extLst>
+  </p:cSld>
+  <p:clrMapOvr>
+    <a:masterClrMapping/>
+  </p:clrMapOvr>
+</p:sld>
+</file>
+
 <file path=ppt/theme/theme1.xml><?xml version="1.0" encoding="utf-8"?>
 <a:theme xmlns:a="http://schemas.openxmlformats.org/drawingml/2006/main" name="UB SEAS CSE">
   <a:themeElements>

</xml_diff>